<commit_message>
update to class 3
</commit_message>
<xml_diff>
--- a/For Animation or Visualization.pptx
+++ b/For Animation or Visualization.pptx
@@ -5,11 +5,13 @@
     <p:sldMasterId id="2147483660" r:id="rId1"/>
   </p:sldMasterIdLst>
   <p:notesMasterIdLst>
-    <p:notesMasterId r:id="rId4"/>
+    <p:notesMasterId r:id="rId6"/>
   </p:notesMasterIdLst>
   <p:sldIdLst>
     <p:sldId id="260" r:id="rId2"/>
-    <p:sldId id="261" r:id="rId3"/>
+    <p:sldId id="263" r:id="rId3"/>
+    <p:sldId id="261" r:id="rId4"/>
+    <p:sldId id="262" r:id="rId5"/>
   </p:sldIdLst>
   <p:sldSz cx="12192000" cy="6858000"/>
   <p:notesSz cx="6858000" cy="9144000"/>
@@ -224,7 +226,7 @@
           <a:p>
             <a:fld id="{CDF57338-1EF8-4B19-ADB0-AF81C40FD6E3}" type="datetimeFigureOut">
               <a:rPr lang="en-US" smtClean="0"/>
-              <a:t>6/23/2021</a:t>
+              <a:t>6/26/2021</a:t>
             </a:fld>
             <a:endParaRPr lang="en-US"/>
           </a:p>
@@ -4033,6 +4035,780 @@
           <a:chExt cx="0" cy="0"/>
         </a:xfrm>
       </p:grpSpPr>
+      <p:pic>
+        <p:nvPicPr>
+          <p:cNvPr id="6" name="Picture 5">
+            <a:extLst>
+              <a:ext uri="{FF2B5EF4-FFF2-40B4-BE49-F238E27FC236}">
+                <a16:creationId xmlns:a16="http://schemas.microsoft.com/office/drawing/2014/main" id="{41A3CB2F-C310-4039-A915-7CA4D3D8960F}"/>
+              </a:ext>
+            </a:extLst>
+          </p:cNvPr>
+          <p:cNvPicPr>
+            <a:picLocks noChangeAspect="1"/>
+          </p:cNvPicPr>
+          <p:nvPr/>
+        </p:nvPicPr>
+        <p:blipFill>
+          <a:blip r:embed="rId2"/>
+          <a:stretch>
+            <a:fillRect/>
+          </a:stretch>
+        </p:blipFill>
+        <p:spPr>
+          <a:xfrm>
+            <a:off x="1823744" y="2147022"/>
+            <a:ext cx="4201111" cy="1895740"/>
+          </a:xfrm>
+          <a:prstGeom prst="rect">
+            <a:avLst/>
+          </a:prstGeom>
+        </p:spPr>
+      </p:pic>
+      <p:sp>
+        <p:nvSpPr>
+          <p:cNvPr id="3" name="Text Placeholder 2">
+            <a:extLst>
+              <a:ext uri="{FF2B5EF4-FFF2-40B4-BE49-F238E27FC236}">
+                <a16:creationId xmlns:a16="http://schemas.microsoft.com/office/drawing/2014/main" id="{832E66F6-1269-4044-B474-7902CAA5045A}"/>
+              </a:ext>
+            </a:extLst>
+          </p:cNvPr>
+          <p:cNvSpPr>
+            <a:spLocks noGrp="1"/>
+          </p:cNvSpPr>
+          <p:nvPr>
+            <p:ph type="body" sz="quarter" idx="14"/>
+          </p:nvPr>
+        </p:nvSpPr>
+        <p:spPr/>
+        <p:txBody>
+          <a:bodyPr/>
+          <a:lstStyle/>
+          <a:p>
+            <a:endParaRPr lang="en-US"/>
+          </a:p>
+        </p:txBody>
+      </p:sp>
+      <p:sp>
+        <p:nvSpPr>
+          <p:cNvPr id="4" name="Slide Number Placeholder 3">
+            <a:extLst>
+              <a:ext uri="{FF2B5EF4-FFF2-40B4-BE49-F238E27FC236}">
+                <a16:creationId xmlns:a16="http://schemas.microsoft.com/office/drawing/2014/main" id="{287D0528-D4B6-4DB3-9D42-144154EF3F11}"/>
+              </a:ext>
+            </a:extLst>
+          </p:cNvPr>
+          <p:cNvSpPr>
+            <a:spLocks noGrp="1"/>
+          </p:cNvSpPr>
+          <p:nvPr>
+            <p:ph type="sldNum" sz="quarter" idx="4"/>
+          </p:nvPr>
+        </p:nvSpPr>
+        <p:spPr/>
+        <p:txBody>
+          <a:bodyPr/>
+          <a:lstStyle/>
+          <a:p>
+            <a:fld id="{597C8632-3067-43D7-B43C-E97E0B501C90}" type="slidenum">
+              <a:rPr lang="en-US" smtClean="0"/>
+              <a:t>2</a:t>
+            </a:fld>
+            <a:endParaRPr lang="en-US" dirty="0"/>
+          </a:p>
+        </p:txBody>
+      </p:sp>
+      <p:sp>
+        <p:nvSpPr>
+          <p:cNvPr id="7" name="Speech Bubble: Rectangle with Corners Rounded 6">
+            <a:extLst>
+              <a:ext uri="{FF2B5EF4-FFF2-40B4-BE49-F238E27FC236}">
+                <a16:creationId xmlns:a16="http://schemas.microsoft.com/office/drawing/2014/main" id="{85BD86A0-17CE-44FE-AB53-CA7B979D4DC7}"/>
+              </a:ext>
+            </a:extLst>
+          </p:cNvPr>
+          <p:cNvSpPr/>
+          <p:nvPr/>
+        </p:nvSpPr>
+        <p:spPr>
+          <a:xfrm>
+            <a:off x="1657349" y="4390037"/>
+            <a:ext cx="3071447" cy="1612628"/>
+          </a:xfrm>
+          <a:prstGeom prst="wedgeRoundRectCallout">
+            <a:avLst>
+              <a:gd name="adj1" fmla="val 20961"/>
+              <a:gd name="adj2" fmla="val -61809"/>
+              <a:gd name="adj3" fmla="val 16667"/>
+            </a:avLst>
+          </a:prstGeom>
+          <a:noFill/>
+          <a:ln w="28575"/>
+        </p:spPr>
+        <p:style>
+          <a:lnRef idx="2">
+            <a:schemeClr val="accent1">
+              <a:shade val="50000"/>
+            </a:schemeClr>
+          </a:lnRef>
+          <a:fillRef idx="1">
+            <a:schemeClr val="accent1"/>
+          </a:fillRef>
+          <a:effectRef idx="0">
+            <a:schemeClr val="accent1"/>
+          </a:effectRef>
+          <a:fontRef idx="minor">
+            <a:schemeClr val="lt1"/>
+          </a:fontRef>
+        </p:style>
+        <p:txBody>
+          <a:bodyPr rtlCol="0" anchor="ctr"/>
+          <a:lstStyle/>
+          <a:p>
+            <a:pPr algn="ctr"/>
+            <a:endParaRPr lang="en-US" dirty="0"/>
+          </a:p>
+        </p:txBody>
+      </p:sp>
+      <p:sp>
+        <p:nvSpPr>
+          <p:cNvPr id="8" name="TextBox 7">
+            <a:extLst>
+              <a:ext uri="{FF2B5EF4-FFF2-40B4-BE49-F238E27FC236}">
+                <a16:creationId xmlns:a16="http://schemas.microsoft.com/office/drawing/2014/main" id="{5D3340B7-A66C-498D-93FB-F55725AC32D5}"/>
+              </a:ext>
+            </a:extLst>
+          </p:cNvPr>
+          <p:cNvSpPr txBox="1"/>
+          <p:nvPr/>
+        </p:nvSpPr>
+        <p:spPr>
+          <a:xfrm>
+            <a:off x="1699683" y="4340002"/>
+            <a:ext cx="2867757" cy="1787723"/>
+          </a:xfrm>
+          <a:prstGeom prst="roundRect">
+            <a:avLst/>
+          </a:prstGeom>
+          <a:noFill/>
+        </p:spPr>
+        <p:txBody>
+          <a:bodyPr wrap="square" rtlCol="0">
+            <a:spAutoFit/>
+          </a:bodyPr>
+          <a:lstStyle/>
+          <a:p>
+            <a:r>
+              <a:rPr lang="zh-CN" altLang="en-US" sz="1100" dirty="0"/>
+              <a:t>比如，这一点</a:t>
+            </a:r>
+            <a:r>
+              <a:rPr lang="en-US" altLang="zh-CN" sz="1100" dirty="0"/>
+              <a:t>(denoted as </a:t>
+            </a:r>
+            <a:r>
+              <a:rPr lang="en-US" altLang="zh-CN" sz="1100" dirty="0" err="1"/>
+              <a:t>i</a:t>
+            </a:r>
+            <a:r>
+              <a:rPr lang="en-US" altLang="zh-CN" sz="1100" dirty="0"/>
+              <a:t>)</a:t>
+            </a:r>
+            <a:r>
+              <a:rPr lang="zh-CN" altLang="en-US" sz="1100" dirty="0"/>
+              <a:t>所能盛的数量等于 </a:t>
+            </a:r>
+            <a:r>
+              <a:rPr lang="en-US" altLang="zh-CN" sz="1100" b="1" dirty="0">
+                <a:solidFill>
+                  <a:schemeClr val="accent1"/>
+                </a:solidFill>
+              </a:rPr>
+              <a:t>min(pre(</a:t>
+            </a:r>
+            <a:r>
+              <a:rPr lang="en-US" altLang="zh-CN" sz="1100" b="1" dirty="0" err="1">
+                <a:solidFill>
+                  <a:schemeClr val="accent1"/>
+                </a:solidFill>
+              </a:rPr>
+              <a:t>i</a:t>
+            </a:r>
+            <a:r>
+              <a:rPr lang="en-US" altLang="zh-CN" sz="1100" b="1" dirty="0">
+                <a:solidFill>
+                  <a:schemeClr val="accent1"/>
+                </a:solidFill>
+              </a:rPr>
+              <a:t>), suffix(</a:t>
+            </a:r>
+            <a:r>
+              <a:rPr lang="en-US" altLang="zh-CN" sz="1100" b="1" dirty="0" err="1">
+                <a:solidFill>
+                  <a:schemeClr val="accent1"/>
+                </a:solidFill>
+              </a:rPr>
+              <a:t>i</a:t>
+            </a:r>
+            <a:r>
+              <a:rPr lang="en-US" altLang="zh-CN" sz="1100" b="1" dirty="0">
+                <a:solidFill>
+                  <a:schemeClr val="accent1"/>
+                </a:solidFill>
+              </a:rPr>
+              <a:t>)) – height(</a:t>
+            </a:r>
+            <a:r>
+              <a:rPr lang="en-US" altLang="zh-CN" sz="1100" b="1" dirty="0" err="1">
+                <a:solidFill>
+                  <a:schemeClr val="accent1"/>
+                </a:solidFill>
+              </a:rPr>
+              <a:t>i</a:t>
+            </a:r>
+            <a:r>
+              <a:rPr lang="en-US" altLang="zh-CN" sz="1100" b="1" dirty="0">
+                <a:solidFill>
+                  <a:schemeClr val="accent1"/>
+                </a:solidFill>
+              </a:rPr>
+              <a:t>), </a:t>
+            </a:r>
+            <a:r>
+              <a:rPr lang="en-US" altLang="zh-CN" sz="1100" dirty="0"/>
+              <a:t>where pre(</a:t>
+            </a:r>
+            <a:r>
+              <a:rPr lang="en-US" altLang="zh-CN" sz="1100" dirty="0" err="1"/>
+              <a:t>i</a:t>
+            </a:r>
+            <a:r>
+              <a:rPr lang="en-US" altLang="zh-CN" sz="1100" dirty="0"/>
+              <a:t>) </a:t>
+            </a:r>
+            <a:r>
+              <a:rPr lang="zh-CN" altLang="en-US" sz="1100" dirty="0"/>
+              <a:t>指的是在</a:t>
+            </a:r>
+            <a:r>
+              <a:rPr lang="en-US" altLang="zh-CN" sz="1100" dirty="0" err="1"/>
+              <a:t>i</a:t>
+            </a:r>
+            <a:r>
+              <a:rPr lang="zh-CN" altLang="en-US" sz="1100" dirty="0"/>
+              <a:t>这一点的前缀</a:t>
+            </a:r>
+            <a:r>
+              <a:rPr lang="en-US" altLang="zh-CN" sz="1100" dirty="0"/>
+              <a:t>max</a:t>
+            </a:r>
+            <a:r>
+              <a:rPr lang="zh-CN" altLang="en-US" sz="1100" dirty="0"/>
+              <a:t>，就是</a:t>
+            </a:r>
+            <a:r>
+              <a:rPr lang="en-US" altLang="zh-CN" sz="1100" dirty="0" err="1"/>
+              <a:t>i</a:t>
+            </a:r>
+            <a:r>
+              <a:rPr lang="zh-CN" altLang="en-US" sz="1100" dirty="0"/>
+              <a:t>这一点前最长的</a:t>
+            </a:r>
+            <a:r>
+              <a:rPr lang="zh-CN" altLang="en-US" sz="1100" b="0" i="0" dirty="0">
+                <a:solidFill>
+                  <a:srgbClr val="262626"/>
+                </a:solidFill>
+                <a:effectLst/>
+                <a:latin typeface="-apple-system"/>
+              </a:rPr>
+              <a:t>柱子。</a:t>
+            </a:r>
+            <a:r>
+              <a:rPr lang="en-US" altLang="zh-CN" sz="1100" dirty="0"/>
+              <a:t>suffix(</a:t>
+            </a:r>
+            <a:r>
+              <a:rPr lang="en-US" altLang="zh-CN" sz="1100" dirty="0" err="1"/>
+              <a:t>i</a:t>
+            </a:r>
+            <a:r>
+              <a:rPr lang="en-US" altLang="zh-CN" sz="1100" dirty="0"/>
+              <a:t>)</a:t>
+            </a:r>
+            <a:r>
+              <a:rPr lang="zh-CN" altLang="en-US" sz="1100" dirty="0"/>
+              <a:t>指的是在</a:t>
+            </a:r>
+            <a:r>
+              <a:rPr lang="en-US" altLang="zh-CN" sz="1100" dirty="0" err="1"/>
+              <a:t>i</a:t>
+            </a:r>
+            <a:r>
+              <a:rPr lang="zh-CN" altLang="en-US" sz="1100" dirty="0"/>
+              <a:t>这一点的后缀</a:t>
+            </a:r>
+            <a:r>
+              <a:rPr lang="en-US" altLang="zh-CN" sz="1100" dirty="0"/>
+              <a:t>max</a:t>
+            </a:r>
+            <a:r>
+              <a:rPr lang="zh-CN" altLang="en-US" sz="1100" dirty="0"/>
+              <a:t>。因为，一点所能盛的最大面积取决于两边最短的那块板，所以这里用</a:t>
+            </a:r>
+            <a:r>
+              <a:rPr lang="en-US" altLang="zh-CN" sz="1100" dirty="0"/>
+              <a:t>Min(..,..)</a:t>
+            </a:r>
+            <a:r>
+              <a:rPr lang="zh-CN" altLang="en-US" sz="1100" dirty="0"/>
+              <a:t>。然后最短那块板，和</a:t>
+            </a:r>
+            <a:r>
+              <a:rPr lang="en-US" altLang="zh-CN" sz="1100" dirty="0" err="1"/>
+              <a:t>i</a:t>
+            </a:r>
+            <a:r>
+              <a:rPr lang="zh-CN" altLang="en-US" sz="1100" dirty="0"/>
+              <a:t>这点的高度之差就是点</a:t>
+            </a:r>
+            <a:r>
+              <a:rPr lang="en-US" altLang="zh-CN" sz="1100" dirty="0" err="1"/>
+              <a:t>i</a:t>
+            </a:r>
+            <a:r>
+              <a:rPr lang="zh-CN" altLang="en-US" sz="1100" dirty="0"/>
+              <a:t>所能盛的雨水量。</a:t>
+            </a:r>
+            <a:endParaRPr lang="en-US" sz="1100" dirty="0"/>
+          </a:p>
+        </p:txBody>
+      </p:sp>
+      <p:cxnSp>
+        <p:nvCxnSpPr>
+          <p:cNvPr id="10" name="Straight Arrow Connector 9">
+            <a:extLst>
+              <a:ext uri="{FF2B5EF4-FFF2-40B4-BE49-F238E27FC236}">
+                <a16:creationId xmlns:a16="http://schemas.microsoft.com/office/drawing/2014/main" id="{855B1083-97FC-4C64-8A1C-DCEB5F7FD658}"/>
+              </a:ext>
+            </a:extLst>
+          </p:cNvPr>
+          <p:cNvCxnSpPr>
+            <a:cxnSpLocks/>
+          </p:cNvCxnSpPr>
+          <p:nvPr/>
+        </p:nvCxnSpPr>
+        <p:spPr>
+          <a:xfrm>
+            <a:off x="3147646" y="3024554"/>
+            <a:ext cx="96716" cy="228600"/>
+          </a:xfrm>
+          <a:prstGeom prst="straightConnector1">
+            <a:avLst/>
+          </a:prstGeom>
+          <a:ln>
+            <a:tailEnd type="triangle"/>
+          </a:ln>
+        </p:spPr>
+        <p:style>
+          <a:lnRef idx="1">
+            <a:schemeClr val="accent1"/>
+          </a:lnRef>
+          <a:fillRef idx="0">
+            <a:schemeClr val="accent1"/>
+          </a:fillRef>
+          <a:effectRef idx="0">
+            <a:schemeClr val="accent1"/>
+          </a:effectRef>
+          <a:fontRef idx="minor">
+            <a:schemeClr val="tx1"/>
+          </a:fontRef>
+        </p:style>
+      </p:cxnSp>
+      <p:cxnSp>
+        <p:nvCxnSpPr>
+          <p:cNvPr id="15" name="Straight Arrow Connector 14">
+            <a:extLst>
+              <a:ext uri="{FF2B5EF4-FFF2-40B4-BE49-F238E27FC236}">
+                <a16:creationId xmlns:a16="http://schemas.microsoft.com/office/drawing/2014/main" id="{A1E521F5-AAA6-4A06-B0F5-B3B1EB0180F9}"/>
+              </a:ext>
+            </a:extLst>
+          </p:cNvPr>
+          <p:cNvCxnSpPr>
+            <a:cxnSpLocks/>
+          </p:cNvCxnSpPr>
+          <p:nvPr/>
+        </p:nvCxnSpPr>
+        <p:spPr>
+          <a:xfrm flipH="1">
+            <a:off x="4440115" y="2766903"/>
+            <a:ext cx="288681" cy="187312"/>
+          </a:xfrm>
+          <a:prstGeom prst="straightConnector1">
+            <a:avLst/>
+          </a:prstGeom>
+          <a:ln>
+            <a:tailEnd type="triangle"/>
+          </a:ln>
+        </p:spPr>
+        <p:style>
+          <a:lnRef idx="1">
+            <a:schemeClr val="accent1"/>
+          </a:lnRef>
+          <a:fillRef idx="0">
+            <a:schemeClr val="accent1"/>
+          </a:fillRef>
+          <a:effectRef idx="0">
+            <a:schemeClr val="accent1"/>
+          </a:effectRef>
+          <a:fontRef idx="minor">
+            <a:schemeClr val="tx1"/>
+          </a:fontRef>
+        </p:style>
+      </p:cxnSp>
+      <p:sp>
+        <p:nvSpPr>
+          <p:cNvPr id="20" name="Rectangle: Rounded Corners 19">
+            <a:extLst>
+              <a:ext uri="{FF2B5EF4-FFF2-40B4-BE49-F238E27FC236}">
+                <a16:creationId xmlns:a16="http://schemas.microsoft.com/office/drawing/2014/main" id="{03255751-DA8E-4282-8307-5EDAADAFAB38}"/>
+              </a:ext>
+            </a:extLst>
+          </p:cNvPr>
+          <p:cNvSpPr/>
+          <p:nvPr/>
+        </p:nvSpPr>
+        <p:spPr>
+          <a:xfrm>
+            <a:off x="2347546" y="2444262"/>
+            <a:ext cx="1266092" cy="509953"/>
+          </a:xfrm>
+          <a:prstGeom prst="roundRect">
+            <a:avLst/>
+          </a:prstGeom>
+          <a:noFill/>
+          <a:ln w="19050"/>
+        </p:spPr>
+        <p:style>
+          <a:lnRef idx="2">
+            <a:schemeClr val="accent6">
+              <a:shade val="50000"/>
+            </a:schemeClr>
+          </a:lnRef>
+          <a:fillRef idx="1">
+            <a:schemeClr val="accent6"/>
+          </a:fillRef>
+          <a:effectRef idx="0">
+            <a:schemeClr val="accent6"/>
+          </a:effectRef>
+          <a:fontRef idx="minor">
+            <a:schemeClr val="lt1"/>
+          </a:fontRef>
+        </p:style>
+        <p:txBody>
+          <a:bodyPr rtlCol="0" anchor="ctr"/>
+          <a:lstStyle/>
+          <a:p>
+            <a:pPr algn="ctr"/>
+            <a:endParaRPr lang="en-US"/>
+          </a:p>
+        </p:txBody>
+      </p:sp>
+      <p:sp>
+        <p:nvSpPr>
+          <p:cNvPr id="21" name="TextBox 20">
+            <a:extLst>
+              <a:ext uri="{FF2B5EF4-FFF2-40B4-BE49-F238E27FC236}">
+                <a16:creationId xmlns:a16="http://schemas.microsoft.com/office/drawing/2014/main" id="{606B2BA9-FDEC-4986-86EA-203AE6B98BD2}"/>
+              </a:ext>
+            </a:extLst>
+          </p:cNvPr>
+          <p:cNvSpPr txBox="1"/>
+          <p:nvPr/>
+        </p:nvSpPr>
+        <p:spPr>
+          <a:xfrm>
+            <a:off x="2432538" y="2463979"/>
+            <a:ext cx="1093177" cy="430887"/>
+          </a:xfrm>
+          <a:prstGeom prst="rect">
+            <a:avLst/>
+          </a:prstGeom>
+          <a:noFill/>
+        </p:spPr>
+        <p:txBody>
+          <a:bodyPr wrap="square" rtlCol="0">
+            <a:spAutoFit/>
+          </a:bodyPr>
+          <a:lstStyle/>
+          <a:p>
+            <a:r>
+              <a:rPr lang="en-US" sz="1100" dirty="0"/>
+              <a:t>Pre(</a:t>
+            </a:r>
+            <a:r>
+              <a:rPr lang="en-US" sz="1100" dirty="0" err="1"/>
+              <a:t>i</a:t>
+            </a:r>
+            <a:r>
+              <a:rPr lang="en-US" sz="1100" dirty="0"/>
+              <a:t>)</a:t>
+            </a:r>
+            <a:r>
+              <a:rPr lang="zh-CN" altLang="en-US" sz="1100" dirty="0"/>
+              <a:t>指的是在</a:t>
+            </a:r>
+            <a:r>
+              <a:rPr lang="en-US" altLang="zh-CN" sz="1100" dirty="0" err="1"/>
+              <a:t>i</a:t>
+            </a:r>
+            <a:r>
+              <a:rPr lang="zh-CN" altLang="en-US" sz="1100" dirty="0"/>
+              <a:t>点的前缀</a:t>
+            </a:r>
+            <a:r>
+              <a:rPr lang="en-US" altLang="zh-CN" sz="1100" dirty="0"/>
+              <a:t>max</a:t>
+            </a:r>
+            <a:endParaRPr lang="en-US" sz="1100" dirty="0"/>
+          </a:p>
+        </p:txBody>
+      </p:sp>
+      <p:sp>
+        <p:nvSpPr>
+          <p:cNvPr id="22" name="TextBox 21">
+            <a:extLst>
+              <a:ext uri="{FF2B5EF4-FFF2-40B4-BE49-F238E27FC236}">
+                <a16:creationId xmlns:a16="http://schemas.microsoft.com/office/drawing/2014/main" id="{76A985EC-5CB1-42E0-95A5-991E36056073}"/>
+              </a:ext>
+            </a:extLst>
+          </p:cNvPr>
+          <p:cNvSpPr txBox="1"/>
+          <p:nvPr/>
+        </p:nvSpPr>
+        <p:spPr>
+          <a:xfrm>
+            <a:off x="3730869" y="3888873"/>
+            <a:ext cx="193430" cy="307777"/>
+          </a:xfrm>
+          <a:prstGeom prst="rect">
+            <a:avLst/>
+          </a:prstGeom>
+          <a:noFill/>
+        </p:spPr>
+        <p:txBody>
+          <a:bodyPr wrap="square" rtlCol="0">
+            <a:spAutoFit/>
+          </a:bodyPr>
+          <a:lstStyle/>
+          <a:p>
+            <a:r>
+              <a:rPr lang="en-US" sz="1400" b="1" dirty="0" err="1"/>
+              <a:t>i</a:t>
+            </a:r>
+            <a:endParaRPr lang="en-US" sz="1400" b="1" dirty="0"/>
+          </a:p>
+        </p:txBody>
+      </p:sp>
+      <p:sp>
+        <p:nvSpPr>
+          <p:cNvPr id="23" name="Rectangle: Rounded Corners 22">
+            <a:extLst>
+              <a:ext uri="{FF2B5EF4-FFF2-40B4-BE49-F238E27FC236}">
+                <a16:creationId xmlns:a16="http://schemas.microsoft.com/office/drawing/2014/main" id="{ED57F825-3197-4E29-8734-F1FE0D4B6DDD}"/>
+              </a:ext>
+            </a:extLst>
+          </p:cNvPr>
+          <p:cNvSpPr/>
+          <p:nvPr/>
+        </p:nvSpPr>
+        <p:spPr>
+          <a:xfrm>
+            <a:off x="4197922" y="2132890"/>
+            <a:ext cx="1306061" cy="600164"/>
+          </a:xfrm>
+          <a:prstGeom prst="roundRect">
+            <a:avLst/>
+          </a:prstGeom>
+          <a:noFill/>
+          <a:ln w="19050"/>
+        </p:spPr>
+        <p:style>
+          <a:lnRef idx="2">
+            <a:schemeClr val="accent6">
+              <a:shade val="50000"/>
+            </a:schemeClr>
+          </a:lnRef>
+          <a:fillRef idx="1">
+            <a:schemeClr val="accent6"/>
+          </a:fillRef>
+          <a:effectRef idx="0">
+            <a:schemeClr val="accent6"/>
+          </a:effectRef>
+          <a:fontRef idx="minor">
+            <a:schemeClr val="lt1"/>
+          </a:fontRef>
+        </p:style>
+        <p:txBody>
+          <a:bodyPr rtlCol="0" anchor="ctr"/>
+          <a:lstStyle/>
+          <a:p>
+            <a:pPr algn="ctr"/>
+            <a:endParaRPr lang="en-US"/>
+          </a:p>
+        </p:txBody>
+      </p:sp>
+      <p:sp>
+        <p:nvSpPr>
+          <p:cNvPr id="24" name="TextBox 23">
+            <a:extLst>
+              <a:ext uri="{FF2B5EF4-FFF2-40B4-BE49-F238E27FC236}">
+                <a16:creationId xmlns:a16="http://schemas.microsoft.com/office/drawing/2014/main" id="{8C519D83-DBD8-498F-89FC-AF3F10F6560D}"/>
+              </a:ext>
+            </a:extLst>
+          </p:cNvPr>
+          <p:cNvSpPr txBox="1"/>
+          <p:nvPr/>
+        </p:nvSpPr>
+        <p:spPr>
+          <a:xfrm>
+            <a:off x="4282916" y="2152607"/>
+            <a:ext cx="1075261" cy="600164"/>
+          </a:xfrm>
+          <a:prstGeom prst="rect">
+            <a:avLst/>
+          </a:prstGeom>
+          <a:noFill/>
+        </p:spPr>
+        <p:txBody>
+          <a:bodyPr wrap="square" rtlCol="0">
+            <a:spAutoFit/>
+          </a:bodyPr>
+          <a:lstStyle/>
+          <a:p>
+            <a:r>
+              <a:rPr lang="en-US" altLang="zh-CN" sz="1100" dirty="0"/>
+              <a:t>suffix</a:t>
+            </a:r>
+            <a:r>
+              <a:rPr lang="en-US" sz="1100" dirty="0"/>
+              <a:t>(</a:t>
+            </a:r>
+            <a:r>
+              <a:rPr lang="en-US" sz="1100" dirty="0" err="1"/>
+              <a:t>i</a:t>
+            </a:r>
+            <a:r>
+              <a:rPr lang="en-US" sz="1100" dirty="0"/>
+              <a:t>) </a:t>
+            </a:r>
+            <a:r>
+              <a:rPr lang="zh-CN" altLang="en-US" sz="1100" dirty="0"/>
+              <a:t>指的是在</a:t>
+            </a:r>
+            <a:r>
+              <a:rPr lang="en-US" altLang="zh-CN" sz="1100" dirty="0" err="1"/>
+              <a:t>i</a:t>
+            </a:r>
+            <a:r>
+              <a:rPr lang="zh-CN" altLang="en-US" sz="1100" dirty="0"/>
+              <a:t>点的后缀</a:t>
+            </a:r>
+            <a:r>
+              <a:rPr lang="en-US" altLang="zh-CN" sz="1100" dirty="0"/>
+              <a:t>max</a:t>
+            </a:r>
+            <a:endParaRPr lang="en-US" sz="1100" dirty="0"/>
+          </a:p>
+        </p:txBody>
+      </p:sp>
+      <p:sp>
+        <p:nvSpPr>
+          <p:cNvPr id="28" name="TextBox 27">
+            <a:extLst>
+              <a:ext uri="{FF2B5EF4-FFF2-40B4-BE49-F238E27FC236}">
+                <a16:creationId xmlns:a16="http://schemas.microsoft.com/office/drawing/2014/main" id="{4F68E6DE-57AB-4E1A-8DD5-FAB7E04BC550}"/>
+              </a:ext>
+            </a:extLst>
+          </p:cNvPr>
+          <p:cNvSpPr txBox="1"/>
+          <p:nvPr/>
+        </p:nvSpPr>
+        <p:spPr>
+          <a:xfrm>
+            <a:off x="4809392" y="4466492"/>
+            <a:ext cx="1371600" cy="1277273"/>
+          </a:xfrm>
+          <a:prstGeom prst="rect">
+            <a:avLst/>
+          </a:prstGeom>
+          <a:noFill/>
+        </p:spPr>
+        <p:txBody>
+          <a:bodyPr wrap="square" rtlCol="0">
+            <a:spAutoFit/>
+          </a:bodyPr>
+          <a:lstStyle/>
+          <a:p>
+            <a:r>
+              <a:rPr lang="en-US" sz="1100" dirty="0"/>
+              <a:t>Note: </a:t>
+            </a:r>
+            <a:r>
+              <a:rPr lang="zh-CN" altLang="en-US" sz="1100" dirty="0"/>
+              <a:t>因为（</a:t>
+            </a:r>
+            <a:r>
+              <a:rPr lang="en-US" altLang="zh-CN" sz="1100" dirty="0"/>
+              <a:t>min()-height</a:t>
+            </a:r>
+            <a:r>
+              <a:rPr lang="zh-CN" altLang="en-US" sz="1100" dirty="0"/>
+              <a:t>）的差可能会为负数，比如最高那个点，所以要用</a:t>
+            </a:r>
+            <a:r>
+              <a:rPr lang="en-US" altLang="zh-CN" sz="1100" dirty="0"/>
+              <a:t>max(0, min()-height)</a:t>
+            </a:r>
+            <a:r>
+              <a:rPr lang="zh-CN" altLang="en-US" sz="1100" dirty="0"/>
+              <a:t>来判断，两者之差是否大于零</a:t>
+            </a:r>
+            <a:endParaRPr lang="en-US" sz="1100" dirty="0"/>
+          </a:p>
+        </p:txBody>
+      </p:sp>
+    </p:spTree>
+    <p:extLst>
+      <p:ext uri="{BB962C8B-B14F-4D97-AF65-F5344CB8AC3E}">
+        <p14:creationId xmlns:p14="http://schemas.microsoft.com/office/powerpoint/2010/main" val="3721940981"/>
+      </p:ext>
+    </p:extLst>
+  </p:cSld>
+  <p:clrMapOvr>
+    <a:masterClrMapping/>
+  </p:clrMapOvr>
+</p:sld>
+</file>
+
+<file path=ppt/slides/slide3.xml><?xml version="1.0" encoding="utf-8"?>
+<p:sld xmlns:a="http://schemas.openxmlformats.org/drawingml/2006/main" xmlns:r="http://schemas.openxmlformats.org/officeDocument/2006/relationships" xmlns:p="http://schemas.openxmlformats.org/presentationml/2006/main">
+  <p:cSld>
+    <p:spTree>
+      <p:nvGrpSpPr>
+        <p:cNvPr id="1" name=""/>
+        <p:cNvGrpSpPr/>
+        <p:nvPr/>
+      </p:nvGrpSpPr>
+      <p:grpSpPr>
+        <a:xfrm>
+          <a:off x="0" y="0"/>
+          <a:ext cx="0" cy="0"/>
+          <a:chOff x="0" y="0"/>
+          <a:chExt cx="0" cy="0"/>
+        </a:xfrm>
+      </p:grpSpPr>
       <p:sp>
         <p:nvSpPr>
           <p:cNvPr id="3" name="Text Placeholder 2">
@@ -4081,7 +4857,7 @@
           <a:p>
             <a:fld id="{597C8632-3067-43D7-B43C-E97E0B501C90}" type="slidenum">
               <a:rPr lang="en-US" smtClean="0"/>
-              <a:t>2</a:t>
+              <a:t>3</a:t>
             </a:fld>
             <a:endParaRPr lang="en-US" dirty="0"/>
           </a:p>
@@ -4328,6 +5104,301 @@
     <p:extLst>
       <p:ext uri="{BB962C8B-B14F-4D97-AF65-F5344CB8AC3E}">
         <p14:creationId xmlns:p14="http://schemas.microsoft.com/office/powerpoint/2010/main" val="2672851338"/>
+      </p:ext>
+    </p:extLst>
+  </p:cSld>
+  <p:clrMapOvr>
+    <a:masterClrMapping/>
+  </p:clrMapOvr>
+</p:sld>
+</file>
+
+<file path=ppt/slides/slide4.xml><?xml version="1.0" encoding="utf-8"?>
+<p:sld xmlns:a="http://schemas.openxmlformats.org/drawingml/2006/main" xmlns:r="http://schemas.openxmlformats.org/officeDocument/2006/relationships" xmlns:p="http://schemas.openxmlformats.org/presentationml/2006/main">
+  <p:cSld>
+    <p:spTree>
+      <p:nvGrpSpPr>
+        <p:cNvPr id="1" name=""/>
+        <p:cNvGrpSpPr/>
+        <p:nvPr/>
+      </p:nvGrpSpPr>
+      <p:grpSpPr>
+        <a:xfrm>
+          <a:off x="0" y="0"/>
+          <a:ext cx="0" cy="0"/>
+          <a:chOff x="0" y="0"/>
+          <a:chExt cx="0" cy="0"/>
+        </a:xfrm>
+      </p:grpSpPr>
+      <p:sp>
+        <p:nvSpPr>
+          <p:cNvPr id="3" name="Text Placeholder 2">
+            <a:extLst>
+              <a:ext uri="{FF2B5EF4-FFF2-40B4-BE49-F238E27FC236}">
+                <a16:creationId xmlns:a16="http://schemas.microsoft.com/office/drawing/2014/main" id="{6B1540EA-979E-424B-A02F-DF50977199D4}"/>
+              </a:ext>
+            </a:extLst>
+          </p:cNvPr>
+          <p:cNvSpPr>
+            <a:spLocks noGrp="1"/>
+          </p:cNvSpPr>
+          <p:nvPr>
+            <p:ph type="body" sz="quarter" idx="14"/>
+          </p:nvPr>
+        </p:nvSpPr>
+        <p:spPr/>
+        <p:txBody>
+          <a:bodyPr/>
+          <a:lstStyle/>
+          <a:p>
+            <a:endParaRPr lang="en-US"/>
+          </a:p>
+        </p:txBody>
+      </p:sp>
+      <p:sp>
+        <p:nvSpPr>
+          <p:cNvPr id="4" name="Slide Number Placeholder 3">
+            <a:extLst>
+              <a:ext uri="{FF2B5EF4-FFF2-40B4-BE49-F238E27FC236}">
+                <a16:creationId xmlns:a16="http://schemas.microsoft.com/office/drawing/2014/main" id="{3E9452B0-8552-4D9C-9837-4200BCBB5F46}"/>
+              </a:ext>
+            </a:extLst>
+          </p:cNvPr>
+          <p:cNvSpPr>
+            <a:spLocks noGrp="1"/>
+          </p:cNvSpPr>
+          <p:nvPr>
+            <p:ph type="sldNum" sz="quarter" idx="4"/>
+          </p:nvPr>
+        </p:nvSpPr>
+        <p:spPr/>
+        <p:txBody>
+          <a:bodyPr/>
+          <a:lstStyle/>
+          <a:p>
+            <a:fld id="{597C8632-3067-43D7-B43C-E97E0B501C90}" type="slidenum">
+              <a:rPr lang="en-US" smtClean="0"/>
+              <a:t>4</a:t>
+            </a:fld>
+            <a:endParaRPr lang="en-US" dirty="0"/>
+          </a:p>
+        </p:txBody>
+      </p:sp>
+      <p:pic>
+        <p:nvPicPr>
+          <p:cNvPr id="1026" name="Picture 2" descr="Gradient Descent- Part 2 - From The GENESIS">
+            <a:extLst>
+              <a:ext uri="{FF2B5EF4-FFF2-40B4-BE49-F238E27FC236}">
+                <a16:creationId xmlns:a16="http://schemas.microsoft.com/office/drawing/2014/main" id="{47E50348-D75B-408F-8E57-A5FB1D3F71E7}"/>
+              </a:ext>
+            </a:extLst>
+          </p:cNvPr>
+          <p:cNvPicPr>
+            <a:picLocks noChangeAspect="1" noChangeArrowheads="1"/>
+          </p:cNvPicPr>
+          <p:nvPr/>
+        </p:nvPicPr>
+        <p:blipFill>
+          <a:blip r:embed="rId2">
+            <a:extLst>
+              <a:ext uri="{28A0092B-C50C-407E-A947-70E740481C1C}">
+                <a14:useLocalDpi xmlns:a14="http://schemas.microsoft.com/office/drawing/2010/main" val="0"/>
+              </a:ext>
+            </a:extLst>
+          </a:blip>
+          <a:srcRect/>
+          <a:stretch>
+            <a:fillRect/>
+          </a:stretch>
+        </p:blipFill>
+        <p:spPr bwMode="auto">
+          <a:xfrm>
+            <a:off x="2804195" y="1952625"/>
+            <a:ext cx="5008065" cy="3214286"/>
+          </a:xfrm>
+          <a:prstGeom prst="rect">
+            <a:avLst/>
+          </a:prstGeom>
+          <a:noFill/>
+          <a:extLst>
+            <a:ext uri="{909E8E84-426E-40DD-AFC4-6F175D3DCCD1}">
+              <a14:hiddenFill xmlns:a14="http://schemas.microsoft.com/office/drawing/2010/main">
+                <a:solidFill>
+                  <a:srgbClr val="FFFFFF"/>
+                </a:solidFill>
+              </a14:hiddenFill>
+            </a:ext>
+          </a:extLst>
+        </p:spPr>
+      </p:pic>
+      <p:cxnSp>
+        <p:nvCxnSpPr>
+          <p:cNvPr id="6" name="Straight Connector 5">
+            <a:extLst>
+              <a:ext uri="{FF2B5EF4-FFF2-40B4-BE49-F238E27FC236}">
+                <a16:creationId xmlns:a16="http://schemas.microsoft.com/office/drawing/2014/main" id="{85617F8A-F8EA-4F20-BFBE-796C09320CCA}"/>
+              </a:ext>
+            </a:extLst>
+          </p:cNvPr>
+          <p:cNvCxnSpPr>
+            <a:cxnSpLocks/>
+          </p:cNvCxnSpPr>
+          <p:nvPr/>
+        </p:nvCxnSpPr>
+        <p:spPr>
+          <a:xfrm>
+            <a:off x="2533880" y="2544897"/>
+            <a:ext cx="5497416" cy="0"/>
+          </a:xfrm>
+          <a:prstGeom prst="line">
+            <a:avLst/>
+          </a:prstGeom>
+          <a:ln w="28575">
+            <a:solidFill>
+              <a:srgbClr val="00B050"/>
+            </a:solidFill>
+          </a:ln>
+        </p:spPr>
+        <p:style>
+          <a:lnRef idx="1">
+            <a:schemeClr val="accent1"/>
+          </a:lnRef>
+          <a:fillRef idx="0">
+            <a:schemeClr val="accent1"/>
+          </a:fillRef>
+          <a:effectRef idx="0">
+            <a:schemeClr val="accent1"/>
+          </a:effectRef>
+          <a:fontRef idx="minor">
+            <a:schemeClr val="tx1"/>
+          </a:fontRef>
+        </p:style>
+      </p:cxnSp>
+      <p:cxnSp>
+        <p:nvCxnSpPr>
+          <p:cNvPr id="10" name="Straight Connector 9">
+            <a:extLst>
+              <a:ext uri="{FF2B5EF4-FFF2-40B4-BE49-F238E27FC236}">
+                <a16:creationId xmlns:a16="http://schemas.microsoft.com/office/drawing/2014/main" id="{0EAFA381-34D9-4645-A674-39A1172D87CA}"/>
+              </a:ext>
+            </a:extLst>
+          </p:cNvPr>
+          <p:cNvCxnSpPr>
+            <a:cxnSpLocks/>
+          </p:cNvCxnSpPr>
+          <p:nvPr/>
+        </p:nvCxnSpPr>
+        <p:spPr>
+          <a:xfrm>
+            <a:off x="5282588" y="4393894"/>
+            <a:ext cx="1327532" cy="0"/>
+          </a:xfrm>
+          <a:prstGeom prst="line">
+            <a:avLst/>
+          </a:prstGeom>
+          <a:ln w="28575">
+            <a:solidFill>
+              <a:srgbClr val="00B0F0"/>
+            </a:solidFill>
+          </a:ln>
+        </p:spPr>
+        <p:style>
+          <a:lnRef idx="1">
+            <a:schemeClr val="accent1"/>
+          </a:lnRef>
+          <a:fillRef idx="0">
+            <a:schemeClr val="accent1"/>
+          </a:fillRef>
+          <a:effectRef idx="0">
+            <a:schemeClr val="accent1"/>
+          </a:effectRef>
+          <a:fontRef idx="minor">
+            <a:schemeClr val="tx1"/>
+          </a:fontRef>
+        </p:style>
+      </p:cxnSp>
+      <p:cxnSp>
+        <p:nvCxnSpPr>
+          <p:cNvPr id="12" name="Straight Arrow Connector 11">
+            <a:extLst>
+              <a:ext uri="{FF2B5EF4-FFF2-40B4-BE49-F238E27FC236}">
+                <a16:creationId xmlns:a16="http://schemas.microsoft.com/office/drawing/2014/main" id="{AC54151E-6A1A-4879-8926-6C8036B2C8F0}"/>
+              </a:ext>
+            </a:extLst>
+          </p:cNvPr>
+          <p:cNvCxnSpPr>
+            <a:cxnSpLocks/>
+          </p:cNvCxnSpPr>
+          <p:nvPr/>
+        </p:nvCxnSpPr>
+        <p:spPr>
+          <a:xfrm>
+            <a:off x="5837506" y="2570600"/>
+            <a:ext cx="0" cy="1716799"/>
+          </a:xfrm>
+          <a:prstGeom prst="straightConnector1">
+            <a:avLst/>
+          </a:prstGeom>
+          <a:ln w="28575">
+            <a:headEnd type="triangle"/>
+            <a:tailEnd type="triangle"/>
+          </a:ln>
+        </p:spPr>
+        <p:style>
+          <a:lnRef idx="1">
+            <a:schemeClr val="accent4"/>
+          </a:lnRef>
+          <a:fillRef idx="0">
+            <a:schemeClr val="accent4"/>
+          </a:fillRef>
+          <a:effectRef idx="0">
+            <a:schemeClr val="accent4"/>
+          </a:effectRef>
+          <a:fontRef idx="minor">
+            <a:schemeClr val="tx1"/>
+          </a:fontRef>
+        </p:style>
+      </p:cxnSp>
+      <p:sp>
+        <p:nvSpPr>
+          <p:cNvPr id="14" name="TextBox 13">
+            <a:extLst>
+              <a:ext uri="{FF2B5EF4-FFF2-40B4-BE49-F238E27FC236}">
+                <a16:creationId xmlns:a16="http://schemas.microsoft.com/office/drawing/2014/main" id="{A5C6035F-D03C-406E-A362-E44BFCC09029}"/>
+              </a:ext>
+            </a:extLst>
+          </p:cNvPr>
+          <p:cNvSpPr txBox="1"/>
+          <p:nvPr/>
+        </p:nvSpPr>
+        <p:spPr>
+          <a:xfrm>
+            <a:off x="5308227" y="3241959"/>
+            <a:ext cx="683046" cy="369324"/>
+          </a:xfrm>
+          <a:prstGeom prst="rect">
+            <a:avLst/>
+          </a:prstGeom>
+          <a:noFill/>
+        </p:spPr>
+        <p:txBody>
+          <a:bodyPr wrap="square" rtlCol="0">
+            <a:spAutoFit/>
+          </a:bodyPr>
+          <a:lstStyle/>
+          <a:p>
+            <a:r>
+              <a:rPr lang="en-US" dirty="0" err="1"/>
+              <a:t>ans</a:t>
+            </a:r>
+            <a:endParaRPr lang="en-US" dirty="0"/>
+          </a:p>
+        </p:txBody>
+      </p:sp>
+    </p:spTree>
+    <p:extLst>
+      <p:ext uri="{BB962C8B-B14F-4D97-AF65-F5344CB8AC3E}">
+        <p14:creationId xmlns:p14="http://schemas.microsoft.com/office/powerpoint/2010/main" val="2245599940"/>
       </p:ext>
     </p:extLst>
   </p:cSld>

</xml_diff>

<commit_message>
Update for class 10
</commit_message>
<xml_diff>
--- a/For Animation or Visualization.pptx
+++ b/For Animation or Visualization.pptx
@@ -5,13 +5,14 @@
     <p:sldMasterId id="2147483660" r:id="rId1"/>
   </p:sldMasterIdLst>
   <p:notesMasterIdLst>
-    <p:notesMasterId r:id="rId6"/>
+    <p:notesMasterId r:id="rId7"/>
   </p:notesMasterIdLst>
   <p:sldIdLst>
     <p:sldId id="260" r:id="rId2"/>
-    <p:sldId id="263" r:id="rId3"/>
-    <p:sldId id="261" r:id="rId4"/>
-    <p:sldId id="262" r:id="rId5"/>
+    <p:sldId id="264" r:id="rId3"/>
+    <p:sldId id="263" r:id="rId4"/>
+    <p:sldId id="261" r:id="rId5"/>
+    <p:sldId id="262" r:id="rId6"/>
   </p:sldIdLst>
   <p:sldSz cx="12192000" cy="6858000"/>
   <p:notesSz cx="6858000" cy="9144000"/>
@@ -226,7 +227,7 @@
           <a:p>
             <a:fld id="{CDF57338-1EF8-4B19-ADB0-AF81C40FD6E3}" type="datetimeFigureOut">
               <a:rPr lang="en-US" smtClean="0"/>
-              <a:t>6/26/2021</a:t>
+              <a:t>7/21/2021</a:t>
             </a:fld>
             <a:endParaRPr lang="en-US"/>
           </a:p>
@@ -4035,6 +4036,314 @@
           <a:chExt cx="0" cy="0"/>
         </a:xfrm>
       </p:grpSpPr>
+      <p:sp>
+        <p:nvSpPr>
+          <p:cNvPr id="2" name="Text Placeholder 1">
+            <a:extLst>
+              <a:ext uri="{FF2B5EF4-FFF2-40B4-BE49-F238E27FC236}">
+                <a16:creationId xmlns:a16="http://schemas.microsoft.com/office/drawing/2014/main" id="{D6E5D98F-1A69-4315-9704-1FBA1EC7820C}"/>
+              </a:ext>
+            </a:extLst>
+          </p:cNvPr>
+          <p:cNvSpPr>
+            <a:spLocks noGrp="1"/>
+          </p:cNvSpPr>
+          <p:nvPr>
+            <p:ph type="body" sz="quarter" idx="13"/>
+          </p:nvPr>
+        </p:nvSpPr>
+        <p:spPr/>
+        <p:txBody>
+          <a:bodyPr/>
+          <a:lstStyle/>
+          <a:p>
+            <a:endParaRPr lang="en-US" dirty="0"/>
+          </a:p>
+        </p:txBody>
+      </p:sp>
+      <p:sp>
+        <p:nvSpPr>
+          <p:cNvPr id="3" name="Text Placeholder 2">
+            <a:extLst>
+              <a:ext uri="{FF2B5EF4-FFF2-40B4-BE49-F238E27FC236}">
+                <a16:creationId xmlns:a16="http://schemas.microsoft.com/office/drawing/2014/main" id="{F5802519-3640-45E0-9FA8-FB8CB18B638B}"/>
+              </a:ext>
+            </a:extLst>
+          </p:cNvPr>
+          <p:cNvSpPr>
+            <a:spLocks noGrp="1"/>
+          </p:cNvSpPr>
+          <p:nvPr>
+            <p:ph type="body" sz="quarter" idx="14"/>
+          </p:nvPr>
+        </p:nvSpPr>
+        <p:spPr/>
+        <p:txBody>
+          <a:bodyPr>
+            <a:normAutofit fontScale="92500" lnSpcReduction="20000"/>
+          </a:bodyPr>
+          <a:lstStyle/>
+          <a:p>
+            <a:r>
+              <a:rPr lang="en-US" altLang="zh-CN" b="0" i="0" u="none" strike="noStrike" dirty="0">
+                <a:solidFill>
+                  <a:srgbClr val="262626"/>
+                </a:solidFill>
+                <a:effectLst/>
+                <a:latin typeface="-apple-system"/>
+                <a:hlinkClick r:id="rId2"/>
+              </a:rPr>
+              <a:t>34. </a:t>
+            </a:r>
+            <a:r>
+              <a:rPr lang="zh-CN" altLang="en-US" b="0" i="0" u="none" strike="noStrike" dirty="0">
+                <a:solidFill>
+                  <a:srgbClr val="262626"/>
+                </a:solidFill>
+                <a:effectLst/>
+                <a:latin typeface="-apple-system"/>
+                <a:hlinkClick r:id="rId2"/>
+              </a:rPr>
+              <a:t>在排序数组中查找元素的第一个和最后一个位置</a:t>
+            </a:r>
+            <a:endParaRPr lang="zh-CN" altLang="en-US" b="0" i="0" dirty="0">
+              <a:solidFill>
+                <a:srgbClr val="262626"/>
+              </a:solidFill>
+              <a:effectLst/>
+              <a:latin typeface="-apple-system"/>
+            </a:endParaRPr>
+          </a:p>
+        </p:txBody>
+      </p:sp>
+      <p:sp>
+        <p:nvSpPr>
+          <p:cNvPr id="4" name="Slide Number Placeholder 3">
+            <a:extLst>
+              <a:ext uri="{FF2B5EF4-FFF2-40B4-BE49-F238E27FC236}">
+                <a16:creationId xmlns:a16="http://schemas.microsoft.com/office/drawing/2014/main" id="{CAD89FAC-8A8B-47D8-AB0B-D37030E5BD8C}"/>
+              </a:ext>
+            </a:extLst>
+          </p:cNvPr>
+          <p:cNvSpPr>
+            <a:spLocks noGrp="1"/>
+          </p:cNvSpPr>
+          <p:nvPr>
+            <p:ph type="sldNum" sz="quarter" idx="4"/>
+          </p:nvPr>
+        </p:nvSpPr>
+        <p:spPr/>
+        <p:txBody>
+          <a:bodyPr/>
+          <a:lstStyle/>
+          <a:p>
+            <a:fld id="{597C8632-3067-43D7-B43C-E97E0B501C90}" type="slidenum">
+              <a:rPr lang="en-US" smtClean="0"/>
+              <a:t>2</a:t>
+            </a:fld>
+            <a:endParaRPr lang="en-US" dirty="0"/>
+          </a:p>
+        </p:txBody>
+      </p:sp>
+      <p:graphicFrame>
+        <p:nvGraphicFramePr>
+          <p:cNvPr id="5" name="Table 5">
+            <a:extLst>
+              <a:ext uri="{FF2B5EF4-FFF2-40B4-BE49-F238E27FC236}">
+                <a16:creationId xmlns:a16="http://schemas.microsoft.com/office/drawing/2014/main" id="{8B9D8398-72D7-46D8-8FED-88BEC212EEB9}"/>
+              </a:ext>
+            </a:extLst>
+          </p:cNvPr>
+          <p:cNvGraphicFramePr>
+            <a:graphicFrameLocks noGrp="1"/>
+          </p:cNvGraphicFramePr>
+          <p:nvPr>
+            <p:extLst>
+              <p:ext uri="{D42A27DB-BD31-4B8C-83A1-F6EECF244321}">
+                <p14:modId xmlns:p14="http://schemas.microsoft.com/office/powerpoint/2010/main" val="3579797622"/>
+              </p:ext>
+            </p:extLst>
+          </p:nvPr>
+        </p:nvGraphicFramePr>
+        <p:xfrm>
+          <a:off x="335085" y="1379089"/>
+          <a:ext cx="6966858" cy="370840"/>
+        </p:xfrm>
+        <a:graphic>
+          <a:graphicData uri="http://schemas.openxmlformats.org/drawingml/2006/table">
+            <a:tbl>
+              <a:tblPr firstRow="1" bandRow="1">
+                <a:tableStyleId>{F5AB1C69-6EDB-4FF4-983F-18BD219EF322}</a:tableStyleId>
+              </a:tblPr>
+              <a:tblGrid>
+                <a:gridCol w="1161143">
+                  <a:extLst>
+                    <a:ext uri="{9D8B030D-6E8A-4147-A177-3AD203B41FA5}">
+                      <a16:colId xmlns:a16="http://schemas.microsoft.com/office/drawing/2014/main" val="2654511156"/>
+                    </a:ext>
+                  </a:extLst>
+                </a:gridCol>
+                <a:gridCol w="1161143">
+                  <a:extLst>
+                    <a:ext uri="{9D8B030D-6E8A-4147-A177-3AD203B41FA5}">
+                      <a16:colId xmlns:a16="http://schemas.microsoft.com/office/drawing/2014/main" val="3942745948"/>
+                    </a:ext>
+                  </a:extLst>
+                </a:gridCol>
+                <a:gridCol w="1161143">
+                  <a:extLst>
+                    <a:ext uri="{9D8B030D-6E8A-4147-A177-3AD203B41FA5}">
+                      <a16:colId xmlns:a16="http://schemas.microsoft.com/office/drawing/2014/main" val="1631506227"/>
+                    </a:ext>
+                  </a:extLst>
+                </a:gridCol>
+                <a:gridCol w="1161143">
+                  <a:extLst>
+                    <a:ext uri="{9D8B030D-6E8A-4147-A177-3AD203B41FA5}">
+                      <a16:colId xmlns:a16="http://schemas.microsoft.com/office/drawing/2014/main" val="3128906740"/>
+                    </a:ext>
+                  </a:extLst>
+                </a:gridCol>
+                <a:gridCol w="1161143">
+                  <a:extLst>
+                    <a:ext uri="{9D8B030D-6E8A-4147-A177-3AD203B41FA5}">
+                      <a16:colId xmlns:a16="http://schemas.microsoft.com/office/drawing/2014/main" val="117292163"/>
+                    </a:ext>
+                  </a:extLst>
+                </a:gridCol>
+                <a:gridCol w="1161143">
+                  <a:extLst>
+                    <a:ext uri="{9D8B030D-6E8A-4147-A177-3AD203B41FA5}">
+                      <a16:colId xmlns:a16="http://schemas.microsoft.com/office/drawing/2014/main" val="3470007494"/>
+                    </a:ext>
+                  </a:extLst>
+                </a:gridCol>
+              </a:tblGrid>
+              <a:tr h="370840">
+                <a:tc>
+                  <a:txBody>
+                    <a:bodyPr/>
+                    <a:lstStyle/>
+                    <a:p>
+                      <a:pPr algn="ctr"/>
+                      <a:r>
+                        <a:rPr lang="en-US" dirty="0"/>
+                        <a:t>5</a:t>
+                      </a:r>
+                    </a:p>
+                  </a:txBody>
+                  <a:tcPr/>
+                </a:tc>
+                <a:tc>
+                  <a:txBody>
+                    <a:bodyPr/>
+                    <a:lstStyle/>
+                    <a:p>
+                      <a:pPr algn="ctr"/>
+                      <a:r>
+                        <a:rPr lang="en-US" dirty="0"/>
+                        <a:t>7</a:t>
+                      </a:r>
+                    </a:p>
+                  </a:txBody>
+                  <a:tcPr/>
+                </a:tc>
+                <a:tc>
+                  <a:txBody>
+                    <a:bodyPr/>
+                    <a:lstStyle/>
+                    <a:p>
+                      <a:pPr algn="ctr"/>
+                      <a:r>
+                        <a:rPr lang="en-US" dirty="0"/>
+                        <a:t>7</a:t>
+                      </a:r>
+                    </a:p>
+                  </a:txBody>
+                  <a:tcPr/>
+                </a:tc>
+                <a:tc>
+                  <a:txBody>
+                    <a:bodyPr/>
+                    <a:lstStyle/>
+                    <a:p>
+                      <a:pPr algn="ctr"/>
+                      <a:r>
+                        <a:rPr lang="en-US" dirty="0"/>
+                        <a:t>8</a:t>
+                      </a:r>
+                    </a:p>
+                  </a:txBody>
+                  <a:tcPr/>
+                </a:tc>
+                <a:tc>
+                  <a:txBody>
+                    <a:bodyPr/>
+                    <a:lstStyle/>
+                    <a:p>
+                      <a:pPr algn="ctr"/>
+                      <a:r>
+                        <a:rPr lang="en-US" dirty="0"/>
+                        <a:t>8</a:t>
+                      </a:r>
+                    </a:p>
+                  </a:txBody>
+                  <a:tcPr/>
+                </a:tc>
+                <a:tc>
+                  <a:txBody>
+                    <a:bodyPr/>
+                    <a:lstStyle/>
+                    <a:p>
+                      <a:pPr algn="ctr"/>
+                      <a:r>
+                        <a:rPr lang="en-US" dirty="0"/>
+                        <a:t>10</a:t>
+                      </a:r>
+                    </a:p>
+                  </a:txBody>
+                  <a:tcPr/>
+                </a:tc>
+                <a:extLst>
+                  <a:ext uri="{0D108BD9-81ED-4DB2-BD59-A6C34878D82A}">
+                    <a16:rowId xmlns:a16="http://schemas.microsoft.com/office/drawing/2014/main" val="2783330131"/>
+                  </a:ext>
+                </a:extLst>
+              </a:tr>
+            </a:tbl>
+          </a:graphicData>
+        </a:graphic>
+      </p:graphicFrame>
+    </p:spTree>
+    <p:extLst>
+      <p:ext uri="{BB962C8B-B14F-4D97-AF65-F5344CB8AC3E}">
+        <p14:creationId xmlns:p14="http://schemas.microsoft.com/office/powerpoint/2010/main" val="1865048819"/>
+      </p:ext>
+    </p:extLst>
+  </p:cSld>
+  <p:clrMapOvr>
+    <a:masterClrMapping/>
+  </p:clrMapOvr>
+</p:sld>
+</file>
+
+<file path=ppt/slides/slide3.xml><?xml version="1.0" encoding="utf-8"?>
+<p:sld xmlns:a="http://schemas.openxmlformats.org/drawingml/2006/main" xmlns:r="http://schemas.openxmlformats.org/officeDocument/2006/relationships" xmlns:p="http://schemas.openxmlformats.org/presentationml/2006/main">
+  <p:cSld>
+    <p:spTree>
+      <p:nvGrpSpPr>
+        <p:cNvPr id="1" name=""/>
+        <p:cNvGrpSpPr/>
+        <p:nvPr/>
+      </p:nvGrpSpPr>
+      <p:grpSpPr>
+        <a:xfrm>
+          <a:off x="0" y="0"/>
+          <a:ext cx="0" cy="0"/>
+          <a:chOff x="0" y="0"/>
+          <a:chExt cx="0" cy="0"/>
+        </a:xfrm>
+      </p:grpSpPr>
       <p:pic>
         <p:nvPicPr>
           <p:cNvPr id="6" name="Picture 5">
@@ -4113,7 +4422,7 @@
           <a:p>
             <a:fld id="{597C8632-3067-43D7-B43C-E97E0B501C90}" type="slidenum">
               <a:rPr lang="en-US" smtClean="0"/>
-              <a:t>2</a:t>
+              <a:t>3</a:t>
             </a:fld>
             <a:endParaRPr lang="en-US" dirty="0"/>
           </a:p>
@@ -4792,7 +5101,7 @@
 </p:sld>
 </file>
 
-<file path=ppt/slides/slide3.xml><?xml version="1.0" encoding="utf-8"?>
+<file path=ppt/slides/slide4.xml><?xml version="1.0" encoding="utf-8"?>
 <p:sld xmlns:a="http://schemas.openxmlformats.org/drawingml/2006/main" xmlns:r="http://schemas.openxmlformats.org/officeDocument/2006/relationships" xmlns:p="http://schemas.openxmlformats.org/presentationml/2006/main">
   <p:cSld>
     <p:spTree>
@@ -4857,7 +5166,7 @@
           <a:p>
             <a:fld id="{597C8632-3067-43D7-B43C-E97E0B501C90}" type="slidenum">
               <a:rPr lang="en-US" smtClean="0"/>
-              <a:t>3</a:t>
+              <a:t>4</a:t>
             </a:fld>
             <a:endParaRPr lang="en-US" dirty="0"/>
           </a:p>
@@ -5113,7 +5422,7 @@
 </p:sld>
 </file>
 
-<file path=ppt/slides/slide4.xml><?xml version="1.0" encoding="utf-8"?>
+<file path=ppt/slides/slide5.xml><?xml version="1.0" encoding="utf-8"?>
 <p:sld xmlns:a="http://schemas.openxmlformats.org/drawingml/2006/main" xmlns:r="http://schemas.openxmlformats.org/officeDocument/2006/relationships" xmlns:p="http://schemas.openxmlformats.org/presentationml/2006/main">
   <p:cSld>
     <p:spTree>
@@ -5178,7 +5487,7 @@
           <a:p>
             <a:fld id="{597C8632-3067-43D7-B43C-E97E0B501C90}" type="slidenum">
               <a:rPr lang="en-US" smtClean="0"/>
-              <a:t>4</a:t>
+              <a:t>5</a:t>
             </a:fld>
             <a:endParaRPr lang="en-US" dirty="0"/>
           </a:p>

</xml_diff>